<commit_message>
i lowkey have no idea what i did
</commit_message>
<xml_diff>
--- a/CS315 P1 Production.pptx
+++ b/CS315 P1 Production.pptx
@@ -127,6 +127,236 @@
 </p:presentation>
 </file>
 
+<file path=ppt/revisionInfo.xml><?xml version="1.0" encoding="utf-8"?>
+<p1510:revInfo xmlns:a="http://schemas.openxmlformats.org/drawingml/2006/main" xmlns:r="http://schemas.openxmlformats.org/officeDocument/2006/relationships" xmlns:p1510="http://schemas.microsoft.com/office/powerpoint/2015/10/main">
+  <p1510:revLst>
+    <p1510:client id="{F7F5C636-30E2-734F-92E9-A24C58332266}" v="10" dt="2024-09-13T20:50:08.350"/>
+  </p1510:revLst>
+</p1510:revInfo>
+</file>
+
+<file path=ppt/changesInfos/changesInfo1.xml><?xml version="1.0" encoding="utf-8"?>
+<pc:chgInfo xmlns:a="http://schemas.openxmlformats.org/drawingml/2006/main" xmlns:r="http://schemas.openxmlformats.org/officeDocument/2006/relationships" xmlns:ac="http://schemas.microsoft.com/office/drawing/2013/main/command" xmlns:pc="http://schemas.microsoft.com/office/powerpoint/2013/main/command">
+  <pc:docChgLst>
+    <pc:chgData name="Smith, Spencer" userId="1695a3fb-7268-4f5e-8a0e-9e4d3170de61" providerId="ADAL" clId="{F7F5C636-30E2-734F-92E9-A24C58332266}"/>
+    <pc:docChg chg="custSel modSld">
+      <pc:chgData name="Smith, Spencer" userId="1695a3fb-7268-4f5e-8a0e-9e4d3170de61" providerId="ADAL" clId="{F7F5C636-30E2-734F-92E9-A24C58332266}" dt="2024-09-13T21:48:45.362" v="3810" actId="20577"/>
+      <pc:docMkLst>
+        <pc:docMk/>
+      </pc:docMkLst>
+      <pc:sldChg chg="addSp delSp modSp mod">
+        <pc:chgData name="Smith, Spencer" userId="1695a3fb-7268-4f5e-8a0e-9e4d3170de61" providerId="ADAL" clId="{F7F5C636-30E2-734F-92E9-A24C58332266}" dt="2024-09-11T16:44:15.396" v="56" actId="1076"/>
+        <pc:sldMkLst>
+          <pc:docMk/>
+          <pc:sldMk cId="4243997784" sldId="256"/>
+        </pc:sldMkLst>
+        <pc:spChg chg="mod">
+          <ac:chgData name="Smith, Spencer" userId="1695a3fb-7268-4f5e-8a0e-9e4d3170de61" providerId="ADAL" clId="{F7F5C636-30E2-734F-92E9-A24C58332266}" dt="2024-09-11T16:43:18.194" v="11" actId="20577"/>
+          <ac:spMkLst>
+            <pc:docMk/>
+            <pc:sldMk cId="4243997784" sldId="256"/>
+            <ac:spMk id="2" creationId="{D8CE1BC7-577C-51C5-2C3C-2C2F81548277}"/>
+          </ac:spMkLst>
+        </pc:spChg>
+        <pc:spChg chg="mod">
+          <ac:chgData name="Smith, Spencer" userId="1695a3fb-7268-4f5e-8a0e-9e4d3170de61" providerId="ADAL" clId="{F7F5C636-30E2-734F-92E9-A24C58332266}" dt="2024-09-11T16:43:40.820" v="51" actId="20577"/>
+          <ac:spMkLst>
+            <pc:docMk/>
+            <pc:sldMk cId="4243997784" sldId="256"/>
+            <ac:spMk id="3" creationId="{82D0ABAB-8A61-2330-FCC4-923DD94BCF2A}"/>
+          </ac:spMkLst>
+        </pc:spChg>
+        <pc:spChg chg="del">
+          <ac:chgData name="Smith, Spencer" userId="1695a3fb-7268-4f5e-8a0e-9e4d3170de61" providerId="ADAL" clId="{F7F5C636-30E2-734F-92E9-A24C58332266}" dt="2024-09-11T16:44:08.262" v="52" actId="478"/>
+          <ac:spMkLst>
+            <pc:docMk/>
+            <pc:sldMk cId="4243997784" sldId="256"/>
+            <ac:spMk id="8" creationId="{2332B84B-7EF7-7F6C-5BF1-0C24E30B3D5D}"/>
+          </ac:spMkLst>
+        </pc:spChg>
+        <pc:picChg chg="add mod">
+          <ac:chgData name="Smith, Spencer" userId="1695a3fb-7268-4f5e-8a0e-9e4d3170de61" providerId="ADAL" clId="{F7F5C636-30E2-734F-92E9-A24C58332266}" dt="2024-09-11T16:44:15.396" v="56" actId="1076"/>
+          <ac:picMkLst>
+            <pc:docMk/>
+            <pc:sldMk cId="4243997784" sldId="256"/>
+            <ac:picMk id="1026" creationId="{B3F703DC-D670-C7F9-EB26-0C36C23A9EF0}"/>
+          </ac:picMkLst>
+        </pc:picChg>
+      </pc:sldChg>
+      <pc:sldChg chg="modSp mod">
+        <pc:chgData name="Smith, Spencer" userId="1695a3fb-7268-4f5e-8a0e-9e4d3170de61" providerId="ADAL" clId="{F7F5C636-30E2-734F-92E9-A24C58332266}" dt="2024-09-13T20:48:14.249" v="874" actId="5793"/>
+        <pc:sldMkLst>
+          <pc:docMk/>
+          <pc:sldMk cId="4270653047" sldId="257"/>
+        </pc:sldMkLst>
+        <pc:spChg chg="mod">
+          <ac:chgData name="Smith, Spencer" userId="1695a3fb-7268-4f5e-8a0e-9e4d3170de61" providerId="ADAL" clId="{F7F5C636-30E2-734F-92E9-A24C58332266}" dt="2024-09-13T20:48:14.249" v="874" actId="5793"/>
+          <ac:spMkLst>
+            <pc:docMk/>
+            <pc:sldMk cId="4270653047" sldId="257"/>
+            <ac:spMk id="3" creationId="{CEFC3362-BE8E-BB9B-F46A-0464325FD189}"/>
+          </ac:spMkLst>
+        </pc:spChg>
+      </pc:sldChg>
+      <pc:sldChg chg="addSp delSp modSp mod">
+        <pc:chgData name="Smith, Spencer" userId="1695a3fb-7268-4f5e-8a0e-9e4d3170de61" providerId="ADAL" clId="{F7F5C636-30E2-734F-92E9-A24C58332266}" dt="2024-09-13T20:50:26.566" v="891" actId="1076"/>
+        <pc:sldMkLst>
+          <pc:docMk/>
+          <pc:sldMk cId="1534912062" sldId="258"/>
+        </pc:sldMkLst>
+        <pc:spChg chg="del">
+          <ac:chgData name="Smith, Spencer" userId="1695a3fb-7268-4f5e-8a0e-9e4d3170de61" providerId="ADAL" clId="{F7F5C636-30E2-734F-92E9-A24C58332266}" dt="2024-09-13T18:21:14.429" v="385"/>
+          <ac:spMkLst>
+            <pc:docMk/>
+            <pc:sldMk cId="1534912062" sldId="258"/>
+            <ac:spMk id="3" creationId="{B733B72D-90B3-6696-1D14-3B7EEC9C4367}"/>
+          </ac:spMkLst>
+        </pc:spChg>
+        <pc:spChg chg="add del mod">
+          <ac:chgData name="Smith, Spencer" userId="1695a3fb-7268-4f5e-8a0e-9e4d3170de61" providerId="ADAL" clId="{F7F5C636-30E2-734F-92E9-A24C58332266}" dt="2024-09-13T18:27:36.133" v="395"/>
+          <ac:spMkLst>
+            <pc:docMk/>
+            <pc:sldMk cId="1534912062" sldId="258"/>
+            <ac:spMk id="6" creationId="{04D51942-7869-007F-2254-75B946154A27}"/>
+          </ac:spMkLst>
+        </pc:spChg>
+        <pc:spChg chg="add del mod">
+          <ac:chgData name="Smith, Spencer" userId="1695a3fb-7268-4f5e-8a0e-9e4d3170de61" providerId="ADAL" clId="{F7F5C636-30E2-734F-92E9-A24C58332266}" dt="2024-09-13T20:48:17.881" v="876"/>
+          <ac:spMkLst>
+            <pc:docMk/>
+            <pc:sldMk cId="1534912062" sldId="258"/>
+            <ac:spMk id="7" creationId="{6A5D0A68-AD33-BA2E-A940-F001944F0356}"/>
+          </ac:spMkLst>
+        </pc:spChg>
+        <pc:spChg chg="add del mod">
+          <ac:chgData name="Smith, Spencer" userId="1695a3fb-7268-4f5e-8a0e-9e4d3170de61" providerId="ADAL" clId="{F7F5C636-30E2-734F-92E9-A24C58332266}" dt="2024-09-13T18:32:35.320" v="397"/>
+          <ac:spMkLst>
+            <pc:docMk/>
+            <pc:sldMk cId="1534912062" sldId="258"/>
+            <ac:spMk id="9" creationId="{70C88858-4938-228C-5CDA-DA587B203DAF}"/>
+          </ac:spMkLst>
+        </pc:spChg>
+        <pc:spChg chg="add del mod">
+          <ac:chgData name="Smith, Spencer" userId="1695a3fb-7268-4f5e-8a0e-9e4d3170de61" providerId="ADAL" clId="{F7F5C636-30E2-734F-92E9-A24C58332266}" dt="2024-09-13T20:50:08.350" v="884"/>
+          <ac:spMkLst>
+            <pc:docMk/>
+            <pc:sldMk cId="1534912062" sldId="258"/>
+            <ac:spMk id="15" creationId="{C414E139-6F30-C3B1-2A64-31DFFF49515D}"/>
+          </ac:spMkLst>
+        </pc:spChg>
+        <pc:picChg chg="add del mod">
+          <ac:chgData name="Smith, Spencer" userId="1695a3fb-7268-4f5e-8a0e-9e4d3170de61" providerId="ADAL" clId="{F7F5C636-30E2-734F-92E9-A24C58332266}" dt="2024-09-13T18:32:33.069" v="396" actId="478"/>
+          <ac:picMkLst>
+            <pc:docMk/>
+            <pc:sldMk cId="1534912062" sldId="258"/>
+            <ac:picMk id="5" creationId="{65E8A0B8-662D-6974-67E4-A065EDF04A16}"/>
+          </ac:picMkLst>
+        </pc:picChg>
+        <pc:picChg chg="add del mod">
+          <ac:chgData name="Smith, Spencer" userId="1695a3fb-7268-4f5e-8a0e-9e4d3170de61" providerId="ADAL" clId="{F7F5C636-30E2-734F-92E9-A24C58332266}" dt="2024-09-13T20:49:50.585" v="883" actId="478"/>
+          <ac:picMkLst>
+            <pc:docMk/>
+            <pc:sldMk cId="1534912062" sldId="258"/>
+            <ac:picMk id="11" creationId="{9FF13410-7F95-A8FB-DD04-D7DD164F0701}"/>
+          </ac:picMkLst>
+        </pc:picChg>
+        <pc:picChg chg="add mod">
+          <ac:chgData name="Smith, Spencer" userId="1695a3fb-7268-4f5e-8a0e-9e4d3170de61" providerId="ADAL" clId="{F7F5C636-30E2-734F-92E9-A24C58332266}" dt="2024-09-13T20:50:26.566" v="891" actId="1076"/>
+          <ac:picMkLst>
+            <pc:docMk/>
+            <pc:sldMk cId="1534912062" sldId="258"/>
+            <ac:picMk id="13" creationId="{8F02A5D6-0689-91E6-EF20-D2CD6D3081C4}"/>
+          </ac:picMkLst>
+        </pc:picChg>
+        <pc:picChg chg="add mod">
+          <ac:chgData name="Smith, Spencer" userId="1695a3fb-7268-4f5e-8a0e-9e4d3170de61" providerId="ADAL" clId="{F7F5C636-30E2-734F-92E9-A24C58332266}" dt="2024-09-13T20:50:23.299" v="890" actId="1076"/>
+          <ac:picMkLst>
+            <pc:docMk/>
+            <pc:sldMk cId="1534912062" sldId="258"/>
+            <ac:picMk id="17" creationId="{94939421-9640-C67B-630C-46CC5BB9E959}"/>
+          </ac:picMkLst>
+        </pc:picChg>
+      </pc:sldChg>
+      <pc:sldChg chg="modSp mod">
+        <pc:chgData name="Smith, Spencer" userId="1695a3fb-7268-4f5e-8a0e-9e4d3170de61" providerId="ADAL" clId="{F7F5C636-30E2-734F-92E9-A24C58332266}" dt="2024-09-13T21:14:00.340" v="1767" actId="20577"/>
+        <pc:sldMkLst>
+          <pc:docMk/>
+          <pc:sldMk cId="141151598" sldId="259"/>
+        </pc:sldMkLst>
+        <pc:spChg chg="mod">
+          <ac:chgData name="Smith, Spencer" userId="1695a3fb-7268-4f5e-8a0e-9e4d3170de61" providerId="ADAL" clId="{F7F5C636-30E2-734F-92E9-A24C58332266}" dt="2024-09-13T21:14:00.340" v="1767" actId="20577"/>
+          <ac:spMkLst>
+            <pc:docMk/>
+            <pc:sldMk cId="141151598" sldId="259"/>
+            <ac:spMk id="3" creationId="{F1BB424B-648E-CA98-63A1-6C47084DBEF4}"/>
+          </ac:spMkLst>
+        </pc:spChg>
+      </pc:sldChg>
+      <pc:sldChg chg="modSp mod">
+        <pc:chgData name="Smith, Spencer" userId="1695a3fb-7268-4f5e-8a0e-9e4d3170de61" providerId="ADAL" clId="{F7F5C636-30E2-734F-92E9-A24C58332266}" dt="2024-09-13T20:51:47.677" v="1145" actId="20577"/>
+        <pc:sldMkLst>
+          <pc:docMk/>
+          <pc:sldMk cId="807574144" sldId="260"/>
+        </pc:sldMkLst>
+        <pc:spChg chg="mod">
+          <ac:chgData name="Smith, Spencer" userId="1695a3fb-7268-4f5e-8a0e-9e4d3170de61" providerId="ADAL" clId="{F7F5C636-30E2-734F-92E9-A24C58332266}" dt="2024-09-13T20:51:47.677" v="1145" actId="20577"/>
+          <ac:spMkLst>
+            <pc:docMk/>
+            <pc:sldMk cId="807574144" sldId="260"/>
+            <ac:spMk id="3" creationId="{4EBBCC92-41D4-E5CE-AA73-32412261B37D}"/>
+          </ac:spMkLst>
+        </pc:spChg>
+      </pc:sldChg>
+      <pc:sldChg chg="modSp mod">
+        <pc:chgData name="Smith, Spencer" userId="1695a3fb-7268-4f5e-8a0e-9e4d3170de61" providerId="ADAL" clId="{F7F5C636-30E2-734F-92E9-A24C58332266}" dt="2024-09-13T21:48:45.362" v="3810" actId="20577"/>
+        <pc:sldMkLst>
+          <pc:docMk/>
+          <pc:sldMk cId="807197754" sldId="261"/>
+        </pc:sldMkLst>
+        <pc:spChg chg="mod">
+          <ac:chgData name="Smith, Spencer" userId="1695a3fb-7268-4f5e-8a0e-9e4d3170de61" providerId="ADAL" clId="{F7F5C636-30E2-734F-92E9-A24C58332266}" dt="2024-09-13T21:48:45.362" v="3810" actId="20577"/>
+          <ac:spMkLst>
+            <pc:docMk/>
+            <pc:sldMk cId="807197754" sldId="261"/>
+            <ac:spMk id="3" creationId="{A5EEE90A-52B2-D429-03B3-3EC46C252AA2}"/>
+          </ac:spMkLst>
+        </pc:spChg>
+      </pc:sldChg>
+      <pc:sldChg chg="modSp mod">
+        <pc:chgData name="Smith, Spencer" userId="1695a3fb-7268-4f5e-8a0e-9e4d3170de61" providerId="ADAL" clId="{F7F5C636-30E2-734F-92E9-A24C58332266}" dt="2024-09-13T21:46:35.425" v="3303" actId="20577"/>
+        <pc:sldMkLst>
+          <pc:docMk/>
+          <pc:sldMk cId="3628775980" sldId="269"/>
+        </pc:sldMkLst>
+        <pc:spChg chg="mod">
+          <ac:chgData name="Smith, Spencer" userId="1695a3fb-7268-4f5e-8a0e-9e4d3170de61" providerId="ADAL" clId="{F7F5C636-30E2-734F-92E9-A24C58332266}" dt="2024-09-13T21:46:35.425" v="3303" actId="20577"/>
+          <ac:spMkLst>
+            <pc:docMk/>
+            <pc:sldMk cId="3628775980" sldId="269"/>
+            <ac:spMk id="3" creationId="{C6B8D691-809F-995D-E93C-32912BBEB486}"/>
+          </ac:spMkLst>
+        </pc:spChg>
+      </pc:sldChg>
+      <pc:sldChg chg="modSp mod">
+        <pc:chgData name="Smith, Spencer" userId="1695a3fb-7268-4f5e-8a0e-9e4d3170de61" providerId="ADAL" clId="{F7F5C636-30E2-734F-92E9-A24C58332266}" dt="2024-09-13T20:52:37.132" v="1163" actId="20577"/>
+        <pc:sldMkLst>
+          <pc:docMk/>
+          <pc:sldMk cId="2037552997" sldId="270"/>
+        </pc:sldMkLst>
+        <pc:spChg chg="mod">
+          <ac:chgData name="Smith, Spencer" userId="1695a3fb-7268-4f5e-8a0e-9e4d3170de61" providerId="ADAL" clId="{F7F5C636-30E2-734F-92E9-A24C58332266}" dt="2024-09-13T20:52:37.132" v="1163" actId="20577"/>
+          <ac:spMkLst>
+            <pc:docMk/>
+            <pc:sldMk cId="2037552997" sldId="270"/>
+            <ac:spMk id="3" creationId="{D87AF36C-8975-2486-9856-AA1CC7EA2794}"/>
+          </ac:spMkLst>
+        </pc:spChg>
+      </pc:sldChg>
+    </pc:docChg>
+  </pc:docChgLst>
+</pc:chgInfo>
+</file>
+
 <file path=ppt/slideLayouts/slideLayout1.xml><?xml version="1.0" encoding="utf-8"?>
 <p:sldLayout xmlns:a="http://schemas.openxmlformats.org/drawingml/2006/main" xmlns:r="http://schemas.openxmlformats.org/officeDocument/2006/relationships" xmlns:p="http://schemas.openxmlformats.org/presentationml/2006/main" type="title" preserve="1">
   <p:cSld name="Title Slide">
@@ -258,7 +488,7 @@
           <a:p>
             <a:fld id="{052CEAA0-CEA8-4860-9757-7A11AC3F23CB}" type="datetimeFigureOut">
               <a:rPr lang="en-US" smtClean="0"/>
-              <a:t>9/6/24</a:t>
+              <a:t>9/13/24</a:t>
             </a:fld>
             <a:endParaRPr lang="en-US"/>
           </a:p>
@@ -428,7 +658,7 @@
           <a:p>
             <a:fld id="{052CEAA0-CEA8-4860-9757-7A11AC3F23CB}" type="datetimeFigureOut">
               <a:rPr lang="en-US" smtClean="0"/>
-              <a:t>9/6/24</a:t>
+              <a:t>9/13/24</a:t>
             </a:fld>
             <a:endParaRPr lang="en-US"/>
           </a:p>
@@ -608,7 +838,7 @@
           <a:p>
             <a:fld id="{052CEAA0-CEA8-4860-9757-7A11AC3F23CB}" type="datetimeFigureOut">
               <a:rPr lang="en-US" smtClean="0"/>
-              <a:t>9/6/24</a:t>
+              <a:t>9/13/24</a:t>
             </a:fld>
             <a:endParaRPr lang="en-US"/>
           </a:p>
@@ -778,7 +1008,7 @@
           <a:p>
             <a:fld id="{052CEAA0-CEA8-4860-9757-7A11AC3F23CB}" type="datetimeFigureOut">
               <a:rPr lang="en-US" smtClean="0"/>
-              <a:t>9/6/24</a:t>
+              <a:t>9/13/24</a:t>
             </a:fld>
             <a:endParaRPr lang="en-US"/>
           </a:p>
@@ -1024,7 +1254,7 @@
           <a:p>
             <a:fld id="{052CEAA0-CEA8-4860-9757-7A11AC3F23CB}" type="datetimeFigureOut">
               <a:rPr lang="en-US" smtClean="0"/>
-              <a:t>9/6/24</a:t>
+              <a:t>9/13/24</a:t>
             </a:fld>
             <a:endParaRPr lang="en-US"/>
           </a:p>
@@ -1256,7 +1486,7 @@
           <a:p>
             <a:fld id="{052CEAA0-CEA8-4860-9757-7A11AC3F23CB}" type="datetimeFigureOut">
               <a:rPr lang="en-US" smtClean="0"/>
-              <a:t>9/6/24</a:t>
+              <a:t>9/13/24</a:t>
             </a:fld>
             <a:endParaRPr lang="en-US"/>
           </a:p>
@@ -1623,7 +1853,7 @@
           <a:p>
             <a:fld id="{052CEAA0-CEA8-4860-9757-7A11AC3F23CB}" type="datetimeFigureOut">
               <a:rPr lang="en-US" smtClean="0"/>
-              <a:t>9/6/24</a:t>
+              <a:t>9/13/24</a:t>
             </a:fld>
             <a:endParaRPr lang="en-US"/>
           </a:p>
@@ -1741,7 +1971,7 @@
           <a:p>
             <a:fld id="{052CEAA0-CEA8-4860-9757-7A11AC3F23CB}" type="datetimeFigureOut">
               <a:rPr lang="en-US" smtClean="0"/>
-              <a:t>9/6/24</a:t>
+              <a:t>9/13/24</a:t>
             </a:fld>
             <a:endParaRPr lang="en-US"/>
           </a:p>
@@ -1836,7 +2066,7 @@
           <a:p>
             <a:fld id="{052CEAA0-CEA8-4860-9757-7A11AC3F23CB}" type="datetimeFigureOut">
               <a:rPr lang="en-US" smtClean="0"/>
-              <a:t>9/6/24</a:t>
+              <a:t>9/13/24</a:t>
             </a:fld>
             <a:endParaRPr lang="en-US"/>
           </a:p>
@@ -2113,7 +2343,7 @@
           <a:p>
             <a:fld id="{052CEAA0-CEA8-4860-9757-7A11AC3F23CB}" type="datetimeFigureOut">
               <a:rPr lang="en-US" smtClean="0"/>
-              <a:t>9/6/24</a:t>
+              <a:t>9/13/24</a:t>
             </a:fld>
             <a:endParaRPr lang="en-US"/>
           </a:p>
@@ -2370,7 +2600,7 @@
           <a:p>
             <a:fld id="{052CEAA0-CEA8-4860-9757-7A11AC3F23CB}" type="datetimeFigureOut">
               <a:rPr lang="en-US" smtClean="0"/>
-              <a:t>9/6/24</a:t>
+              <a:t>9/13/24</a:t>
             </a:fld>
             <a:endParaRPr lang="en-US"/>
           </a:p>
@@ -2583,7 +2813,7 @@
           <a:p>
             <a:fld id="{052CEAA0-CEA8-4860-9757-7A11AC3F23CB}" type="datetimeFigureOut">
               <a:rPr lang="en-US" smtClean="0"/>
-              <a:t>9/6/24</a:t>
+              <a:t>9/13/24</a:t>
             </a:fld>
             <a:endParaRPr lang="en-US"/>
           </a:p>
@@ -3011,7 +3241,7 @@
           <a:p>
             <a:r>
               <a:rPr lang="en-US" dirty="0"/>
-              <a:t>{ your game title here }</a:t>
+              <a:t>Mad Flyers</a:t>
             </a:r>
           </a:p>
         </p:txBody>
@@ -3039,28 +3269,20 @@
           <a:p>
             <a:r>
               <a:rPr lang="en-US" dirty="0"/>
-              <a:t>N315 – Project One</a:t>
-            </a:r>
-          </a:p>
-          <a:p>
-            <a:r>
-              <a:rPr lang="en-US" dirty="0"/>
-              <a:t>{ your name here } { yes your actual name you goof. }</a:t>
+              <a:t>CS315 – Project One</a:t>
+            </a:r>
+          </a:p>
+          <a:p>
+            <a:r>
+              <a:rPr lang="en-US" dirty="0"/>
+              <a:t>Spencer Smith</a:t>
             </a:r>
             <a:br>
               <a:rPr lang="en-US" dirty="0"/>
             </a:br>
             <a:r>
               <a:rPr lang="en-US" dirty="0"/>
-              <a:t>{mm/</a:t>
-            </a:r>
-            <a:r>
-              <a:rPr lang="en-US" dirty="0" err="1"/>
-              <a:t>yy</a:t>
-            </a:r>
-            <a:r>
-              <a:rPr lang="en-US" dirty="0"/>
-              <a:t>}</a:t>
+              <a:t>09/24</a:t>
             </a:r>
           </a:p>
         </p:txBody>
@@ -3104,41 +3326,53 @@
           </a:prstGeom>
         </p:spPr>
       </p:pic>
-      <p:sp>
-        <p:nvSpPr>
-          <p:cNvPr id="8" name="TextBox 7">
+      <p:pic>
+        <p:nvPicPr>
+          <p:cNvPr id="1026" name="Picture 2" descr="Angry Birds real life - Drawception">
             <a:extLst>
               <a:ext uri="{FF2B5EF4-FFF2-40B4-BE49-F238E27FC236}">
-                <a16:creationId xmlns:a16="http://schemas.microsoft.com/office/drawing/2014/main" id="{2332B84B-7EF7-7F6C-5BF1-0C24E30B3D5D}"/>
+                <a16:creationId xmlns:a16="http://schemas.microsoft.com/office/drawing/2014/main" id="{B3F703DC-D670-C7F9-EB26-0C36C23A9EF0}"/>
               </a:ext>
             </a:extLst>
           </p:cNvPr>
-          <p:cNvSpPr txBox="1"/>
+          <p:cNvPicPr>
+            <a:picLocks noChangeAspect="1" noChangeArrowheads="1"/>
+          </p:cNvPicPr>
           <p:nvPr/>
-        </p:nvSpPr>
-        <p:spPr>
+        </p:nvPicPr>
+        <p:blipFill>
+          <a:blip r:embed="rId4">
+            <a:extLst>
+              <a:ext uri="{28A0092B-C50C-407E-A947-70E740481C1C}">
+                <a14:useLocalDpi xmlns:a14="http://schemas.microsoft.com/office/drawing/2010/main" val="0"/>
+              </a:ext>
+            </a:extLst>
+          </a:blip>
+          <a:srcRect/>
+          <a:stretch>
+            <a:fillRect/>
+          </a:stretch>
+        </p:blipFill>
+        <p:spPr bwMode="auto">
           <a:xfrm>
-            <a:off x="1126067" y="338721"/>
-            <a:ext cx="4189288" cy="369332"/>
+            <a:off x="2265319" y="248445"/>
+            <a:ext cx="1986914" cy="1655762"/>
           </a:xfrm>
           <a:prstGeom prst="rect">
             <a:avLst/>
           </a:prstGeom>
           <a:noFill/>
+          <a:extLst>
+            <a:ext uri="{909E8E84-426E-40DD-AFC4-6F175D3DCCD1}">
+              <a14:hiddenFill xmlns:a14="http://schemas.microsoft.com/office/drawing/2010/main">
+                <a:solidFill>
+                  <a:srgbClr val="FFFFFF"/>
+                </a:solidFill>
+              </a14:hiddenFill>
+            </a:ext>
+          </a:extLst>
         </p:spPr>
-        <p:txBody>
-          <a:bodyPr wrap="none" rtlCol="0">
-            <a:spAutoFit/>
-          </a:bodyPr>
-          <a:lstStyle/>
-          <a:p>
-            <a:r>
-              <a:rPr lang="en-US" dirty="0"/>
-              <a:t>{ Feel free to insert images here or delete }</a:t>
-            </a:r>
-          </a:p>
-        </p:txBody>
-      </p:sp>
+      </p:pic>
     </p:spTree>
     <p:extLst>
       <p:ext uri="{BB962C8B-B14F-4D97-AF65-F5344CB8AC3E}">
@@ -4041,7 +4275,54 @@
           <a:bodyPr/>
           <a:lstStyle/>
           <a:p>
-            <a:endParaRPr lang="en-US"/>
+            <a:r>
+              <a:rPr lang="en-US" dirty="0"/>
+              <a:t>I don’t want a static “</a:t>
+            </a:r>
+            <a:r>
+              <a:rPr lang="en-US" dirty="0" err="1"/>
+              <a:t>num_enemies</a:t>
+            </a:r>
+            <a:r>
+              <a:rPr lang="en-US" dirty="0"/>
+              <a:t>” variable. I want it to change based on how many enemies are on the screen, that way I can freely change the levels without going in and tweaking the code.</a:t>
+            </a:r>
+          </a:p>
+          <a:p>
+            <a:r>
+              <a:rPr lang="en-US" dirty="0"/>
+              <a:t>By using </a:t>
+            </a:r>
+            <a:r>
+              <a:rPr lang="en-US" dirty="0" err="1"/>
+              <a:t>get_parent</a:t>
+            </a:r>
+            <a:r>
+              <a:rPr lang="en-US" dirty="0"/>
+              <a:t>().</a:t>
+            </a:r>
+            <a:r>
+              <a:rPr lang="en-US" dirty="0" err="1"/>
+              <a:t>find_child</a:t>
+            </a:r>
+            <a:r>
+              <a:rPr lang="en-US" dirty="0"/>
+              <a:t>()…… I am able to search for a specific node, in this case, called “Enemies”. This node contains all of the enemy objects for the level, so by using </a:t>
+            </a:r>
+            <a:r>
+              <a:rPr lang="en-US" dirty="0" err="1"/>
+              <a:t>get_child_count</a:t>
+            </a:r>
+            <a:r>
+              <a:rPr lang="en-US" dirty="0"/>
+              <a:t>(), I’m able to find the number of enemies on the screen. Now I don’t have to tweak the code every time I change a level.</a:t>
+            </a:r>
+          </a:p>
+          <a:p>
+            <a:pPr marL="0" indent="0">
+              <a:buNone/>
+            </a:pPr>
+            <a:endParaRPr lang="en-US" dirty="0"/>
           </a:p>
         </p:txBody>
       </p:sp>
@@ -4113,31 +4394,77 @@
           </a:p>
         </p:txBody>
       </p:sp>
-      <p:sp>
-        <p:nvSpPr>
-          <p:cNvPr id="3" name="Content Placeholder 2">
+      <p:pic>
+        <p:nvPicPr>
+          <p:cNvPr id="13" name="Picture 12" descr="A computer screen shot of text&#10;&#10;Description automatically generated">
             <a:extLst>
               <a:ext uri="{FF2B5EF4-FFF2-40B4-BE49-F238E27FC236}">
-                <a16:creationId xmlns:a16="http://schemas.microsoft.com/office/drawing/2014/main" id="{B733B72D-90B3-6696-1D14-3B7EEC9C4367}"/>
+                <a16:creationId xmlns:a16="http://schemas.microsoft.com/office/drawing/2014/main" id="{8F02A5D6-0689-91E6-EF20-D2CD6D3081C4}"/>
               </a:ext>
             </a:extLst>
           </p:cNvPr>
-          <p:cNvSpPr>
-            <a:spLocks noGrp="1"/>
-          </p:cNvSpPr>
+          <p:cNvPicPr>
+            <a:picLocks noChangeAspect="1"/>
+          </p:cNvPicPr>
+          <p:nvPr/>
+        </p:nvPicPr>
+        <p:blipFill>
+          <a:blip r:embed="rId2">
+            <a:extLst>
+              <a:ext uri="{28A0092B-C50C-407E-A947-70E740481C1C}">
+                <a14:useLocalDpi xmlns:a14="http://schemas.microsoft.com/office/drawing/2010/main" val="0"/>
+              </a:ext>
+            </a:extLst>
+          </a:blip>
+          <a:stretch>
+            <a:fillRect/>
+          </a:stretch>
+        </p:blipFill>
+        <p:spPr>
+          <a:xfrm>
+            <a:off x="2392049" y="3429000"/>
+            <a:ext cx="9093827" cy="2292350"/>
+          </a:xfrm>
+          <a:prstGeom prst="rect">
+            <a:avLst/>
+          </a:prstGeom>
+        </p:spPr>
+      </p:pic>
+      <p:pic>
+        <p:nvPicPr>
+          <p:cNvPr id="17" name="Content Placeholder 16">
+            <a:extLst>
+              <a:ext uri="{FF2B5EF4-FFF2-40B4-BE49-F238E27FC236}">
+                <a16:creationId xmlns:a16="http://schemas.microsoft.com/office/drawing/2014/main" id="{94939421-9640-C67B-630C-46CC5BB9E959}"/>
+              </a:ext>
+            </a:extLst>
+          </p:cNvPr>
+          <p:cNvPicPr>
+            <a:picLocks noGrp="1" noChangeAspect="1"/>
+          </p:cNvPicPr>
           <p:nvPr>
             <p:ph idx="1"/>
           </p:nvPr>
-        </p:nvSpPr>
-        <p:spPr/>
-        <p:txBody>
-          <a:bodyPr/>
-          <a:lstStyle/>
-          <a:p>
-            <a:endParaRPr lang="en-US"/>
-          </a:p>
-        </p:txBody>
-      </p:sp>
+        </p:nvPicPr>
+        <p:blipFill>
+          <a:blip r:embed="rId3">
+            <a:extLst>
+              <a:ext uri="{28A0092B-C50C-407E-A947-70E740481C1C}">
+                <a14:useLocalDpi xmlns:a14="http://schemas.microsoft.com/office/drawing/2010/main" val="0"/>
+              </a:ext>
+            </a:extLst>
+          </a:blip>
+          <a:stretch>
+            <a:fillRect/>
+          </a:stretch>
+        </p:blipFill>
+        <p:spPr>
+          <a:xfrm>
+            <a:off x="460374" y="1690688"/>
+            <a:ext cx="10587207" cy="540544"/>
+          </a:xfrm>
+        </p:spPr>
+      </p:pic>
     </p:spTree>
     <p:extLst>
       <p:ext uri="{BB962C8B-B14F-4D97-AF65-F5344CB8AC3E}">
@@ -4229,7 +4556,7 @@
           <a:p>
             <a:r>
               <a:rPr lang="en-US" dirty="0"/>
-              <a:t>What is something you are struggling with in your game?</a:t>
+              <a:t>How do I make it so that when there are multiple player fish on the screen, they move independently? Right now, if a new fish is spawned and I fling it, all of the other fish also fling.</a:t>
             </a:r>
           </a:p>
         </p:txBody>
@@ -4342,6 +4669,13 @@
             </a:r>
           </a:p>
           <a:p>
+            <a:pPr lvl="2"/>
+            <a:r>
+              <a:rPr lang="en-US" dirty="0"/>
+              <a:t>Evan said my structure is well organized and he could find where everything was.</a:t>
+            </a:r>
+          </a:p>
+          <a:p>
             <a:pPr lvl="1"/>
             <a:r>
               <a:rPr lang="en-US" dirty="0"/>
@@ -4349,6 +4683,13 @@
             </a:r>
           </a:p>
           <a:p>
+            <a:pPr lvl="2"/>
+            <a:r>
+              <a:rPr lang="en-US" dirty="0"/>
+              <a:t>The comments make the code easily understandable.</a:t>
+            </a:r>
+          </a:p>
+          <a:p>
             <a:pPr lvl="1"/>
             <a:r>
               <a:rPr lang="en-US" dirty="0"/>
@@ -4356,6 +4697,13 @@
             </a:r>
           </a:p>
           <a:p>
+            <a:pPr lvl="2"/>
+            <a:r>
+              <a:rPr lang="en-US" dirty="0"/>
+              <a:t>There is no unnecessary repetitions. Any repeated lines of code are in functions.</a:t>
+            </a:r>
+          </a:p>
+          <a:p>
             <a:pPr lvl="1"/>
             <a:r>
               <a:rPr lang="en-US" dirty="0"/>
@@ -4363,10 +4711,32 @@
             </a:r>
           </a:p>
           <a:p>
+            <a:pPr lvl="2"/>
+            <a:r>
+              <a:rPr lang="en-US" dirty="0"/>
+              <a:t>Very readable. Everything makes sense.</a:t>
+            </a:r>
+          </a:p>
+          <a:p>
             <a:pPr lvl="1"/>
             <a:r>
               <a:rPr lang="en-US" dirty="0"/>
               <a:t>Succinctness </a:t>
+            </a:r>
+          </a:p>
+          <a:p>
+            <a:pPr lvl="2"/>
+            <a:r>
+              <a:rPr lang="en-US" dirty="0"/>
+              <a:t>There are some lines of the code that could </a:t>
+            </a:r>
+            <a:r>
+              <a:rPr lang="en-US" i="1" dirty="0"/>
+              <a:t>probably</a:t>
+            </a:r>
+            <a:r>
+              <a:rPr lang="en-US" dirty="0"/>
+              <a:t> be shortened. </a:t>
             </a:r>
           </a:p>
         </p:txBody>
@@ -4462,32 +4832,19 @@
           <a:p>
             <a:r>
               <a:rPr lang="en-US" dirty="0"/>
-              <a:t>Delete this and add 2-3 takeaways from your discussion with your peer</a:t>
-            </a:r>
-          </a:p>
-          <a:p>
-            <a:r>
-              <a:rPr lang="en-US" dirty="0"/>
-              <a:t>Learned X</a:t>
-            </a:r>
-          </a:p>
-          <a:p>
-            <a:r>
-              <a:rPr lang="en-US" dirty="0"/>
-              <a:t>Decided Y would be important to focus on next</a:t>
-            </a:r>
-          </a:p>
-          <a:p>
-            <a:r>
-              <a:rPr lang="en-US" dirty="0"/>
-              <a:t>Focus on coding principles:</a:t>
-            </a:r>
-          </a:p>
-          <a:p>
-            <a:pPr lvl="1"/>
-            <a:r>
-              <a:rPr lang="en-US" dirty="0"/>
-              <a:t>Commenting, indentation, good variable names, general structure</a:t>
+              <a:t>I learned how to get specific nodes from the node tree within a script, which will allow me to manipulate more aspects of my game.</a:t>
+            </a:r>
+          </a:p>
+          <a:p>
+            <a:r>
+              <a:rPr lang="en-US" dirty="0"/>
+              <a:t>Next, I’m going to focus on getting the birds to move independently, rather than all moving off of one input.</a:t>
+            </a:r>
+          </a:p>
+          <a:p>
+            <a:r>
+              <a:rPr lang="en-US" dirty="0"/>
+              <a:t>I’m very happy with my quality of code in terms of readability, variable names, etc., but I’m sure there are more efficient ways to do some of it. I’ll find those ways later on in the project.</a:t>
             </a:r>
           </a:p>
           <a:p>
@@ -4582,7 +4939,9 @@
         </p:nvSpPr>
         <p:spPr/>
         <p:txBody>
-          <a:bodyPr/>
+          <a:bodyPr>
+            <a:normAutofit fontScale="92500" lnSpcReduction="10000"/>
+          </a:bodyPr>
           <a:lstStyle/>
           <a:p>
             <a:r>
@@ -4594,22 +4953,49 @@
             <a:pPr lvl="1"/>
             <a:r>
               <a:rPr lang="en-US" dirty="0"/>
-              <a:t>Unknowns about Godot</a:t>
+              <a:t>I gained a better understanding of how export variables work. I’m also more comfortable with referencing other nodes within my code.</a:t>
             </a:r>
           </a:p>
           <a:p>
             <a:pPr lvl="1"/>
             <a:r>
               <a:rPr lang="en-US" dirty="0"/>
-              <a:t>New resources found</a:t>
+              <a:t>I really like that you can use </a:t>
+            </a:r>
+            <a:r>
+              <a:rPr lang="en-US" dirty="0" err="1"/>
+              <a:t>find_child</a:t>
+            </a:r>
+            <a:r>
+              <a:rPr lang="en-US" dirty="0"/>
+              <a:t>() to get a specific node in a tree, rather than searching for it using an index. I feel like by searching with an index, it would be easy for things to break because the order of nodes in a tree is always subject to change.</a:t>
             </a:r>
           </a:p>
           <a:p>
             <a:pPr lvl="1"/>
             <a:r>
               <a:rPr lang="en-US" dirty="0"/>
-              <a:t>What you tried that didn’t work – and how you’re going to try something new</a:t>
-            </a:r>
+              <a:t>One thing I’m not happy with is that every time an enemy is killed, a new player fish is spawned. I need to look into that.</a:t>
+            </a:r>
+          </a:p>
+          <a:p>
+            <a:pPr lvl="1"/>
+            <a:r>
+              <a:rPr lang="en-US" dirty="0"/>
+              <a:t>One helpful piece of feedback I received was from Evan about how a specific line of code seemed longer than it needs to be. I just need to do some more research and figure out how to cut it down.</a:t>
+            </a:r>
+          </a:p>
+          <a:p>
+            <a:pPr lvl="2"/>
+            <a:r>
+              <a:rPr lang="en-US" dirty="0"/>
+              <a:t>I can give helpful feedback by being specific about what I think should be done differently. Just saying “some of your comments are unnecessary” is not helpful. Instead, ”this comment on this line is bad” would be much </a:t>
+            </a:r>
+            <a:r>
+              <a:rPr lang="en-US"/>
+              <a:t>more insightful. </a:t>
+            </a:r>
+            <a:endParaRPr lang="en-US" dirty="0"/>
           </a:p>
         </p:txBody>
       </p:sp>
@@ -4711,16 +5097,28 @@
             <a:pPr marL="0" indent="0">
               <a:buNone/>
             </a:pPr>
-            <a:r>
-              <a:rPr lang="en-US" dirty="0"/>
-              <a:t>Bold your self-assessment on the following areas</a:t>
-            </a:r>
+            <a:endParaRPr lang="en-US" dirty="0"/>
           </a:p>
           <a:p>
             <a:pPr marL="0" indent="0">
               <a:buNone/>
             </a:pPr>
-            <a:endParaRPr lang="en-US" dirty="0"/>
+            <a:r>
+              <a:rPr lang="en-US" dirty="0"/>
+              <a:t>Project progress			poor	</a:t>
+            </a:r>
+            <a:r>
+              <a:rPr lang="en-US" b="1" dirty="0">
+                <a:solidFill>
+                  <a:srgbClr val="FF0000"/>
+                </a:solidFill>
+              </a:rPr>
+              <a:t>acceptable</a:t>
+            </a:r>
+            <a:r>
+              <a:rPr lang="en-US" dirty="0"/>
+              <a:t>	excellent</a:t>
+            </a:r>
           </a:p>
           <a:p>
             <a:pPr marL="0" indent="0">
@@ -4728,7 +5126,15 @@
             </a:pPr>
             <a:r>
               <a:rPr lang="en-US" dirty="0"/>
-              <a:t>Project progress			poor	acceptable	excellent</a:t>
+              <a:t>Variable naming			poor	acceptable	</a:t>
+            </a:r>
+            <a:r>
+              <a:rPr lang="en-US" b="1" dirty="0">
+                <a:solidFill>
+                  <a:srgbClr val="FF0000"/>
+                </a:solidFill>
+              </a:rPr>
+              <a:t>excellent</a:t>
             </a:r>
           </a:p>
           <a:p>
@@ -4737,7 +5143,15 @@
             </a:pPr>
             <a:r>
               <a:rPr lang="en-US" dirty="0"/>
-              <a:t>Variable naming			poor	acceptable	excellent</a:t>
+              <a:t>Debugging / problem solving	poor	acceptable	</a:t>
+            </a:r>
+            <a:r>
+              <a:rPr lang="en-US" b="1" dirty="0">
+                <a:solidFill>
+                  <a:srgbClr val="FF0000"/>
+                </a:solidFill>
+              </a:rPr>
+              <a:t>excellent</a:t>
             </a:r>
           </a:p>
           <a:p>
@@ -4746,7 +5160,15 @@
             </a:pPr>
             <a:r>
               <a:rPr lang="en-US" dirty="0"/>
-              <a:t>Debugging / problem solving	poor	acceptable	excellent</a:t>
+              <a:t>Godot exploration			poor	acceptable	</a:t>
+            </a:r>
+            <a:r>
+              <a:rPr lang="en-US" b="1" dirty="0">
+                <a:solidFill>
+                  <a:srgbClr val="FF0000"/>
+                </a:solidFill>
+              </a:rPr>
+              <a:t>excellent</a:t>
             </a:r>
           </a:p>
           <a:p>
@@ -4755,16 +5177,19 @@
             </a:pPr>
             <a:r>
               <a:rPr lang="en-US" dirty="0"/>
-              <a:t>Godot exploration			poor	acceptable	excellent</a:t>
-            </a:r>
-          </a:p>
-          <a:p>
-            <a:pPr marL="0" indent="0">
-              <a:buNone/>
-            </a:pPr>
-            <a:r>
-              <a:rPr lang="en-US" dirty="0"/>
-              <a:t>Polish plans				poor	acceptable	excellent</a:t>
+              <a:t>Polish plans				poor	</a:t>
+            </a:r>
+            <a:r>
+              <a:rPr lang="en-US" b="1" dirty="0">
+                <a:solidFill>
+                  <a:srgbClr val="FF0000"/>
+                </a:solidFill>
+              </a:rPr>
+              <a:t>acceptable</a:t>
+            </a:r>
+            <a:r>
+              <a:rPr lang="en-US" dirty="0"/>
+              <a:t>	excellent</a:t>
             </a:r>
           </a:p>
         </p:txBody>

</xml_diff>